<commit_message>
Plots added to presentation
</commit_message>
<xml_diff>
--- a/TermProject_Presentationv3.pptx
+++ b/TermProject_Presentationv3.pptx
@@ -17,6 +17,7 @@
     <p:sldId id="265" r:id="rId11"/>
     <p:sldId id="266" r:id="rId12"/>
     <p:sldId id="267" r:id="rId13"/>
+    <p:sldId id="268" r:id="rId14"/>
   </p:sldIdLst>
   <p:sldSz cx="9144000" cy="5143500" type="screen16x9"/>
   <p:notesSz cx="6858000" cy="9144000"/>
@@ -3126,7 +3127,7 @@
             </a:pPr>
             <a:r>
               <a:rPr/>
-              <a:t>TermProject_Presentationv2</a:t>
+              <a:t>TermProject_Presentation</a:t>
             </a:r>
           </a:p>
         </p:txBody>
@@ -3230,7 +3231,7 @@
             </a:pPr>
             <a:r>
               <a:rPr/>
-              <a:t>Plots of Interest</a:t>
+              <a:t>Findings</a:t>
             </a:r>
           </a:p>
         </p:txBody>
@@ -3250,49 +3251,24 @@
           <a:bodyPr/>
           <a:lstStyle/>
           <a:p>
-            <a:pPr lvl="0" indent="0" marL="0">
-              <a:buNone/>
-            </a:pPr>
-            <a:r>
-              <a:rPr/>
-              <a:t>fighter per year (look at COVID impact)</a:t>
-            </a:r>
-          </a:p>
-          <a:p>
-            <a:pPr lvl="0" indent="0">
-              <a:buNone/>
-            </a:pPr>
-            <a:r>
-              <a:rPr>
-                <a:solidFill>
-                  <a:srgbClr val="06287E"/>
-                </a:solidFill>
-                <a:latin typeface="Courier"/>
-              </a:rPr>
-              <a:t>summary</a:t>
-            </a:r>
-            <a:r>
-              <a:rPr>
-                <a:latin typeface="Courier"/>
-              </a:rPr>
-              <a:t>(cars)</a:t>
-            </a:r>
-          </a:p>
-          <a:p>
-            <a:pPr lvl="0" indent="0">
-              <a:buNone/>
-            </a:pPr>
-            <a:r>
-              <a:rPr>
-                <a:latin typeface="Courier"/>
-              </a:rPr>
-              <a:t>##      speed           dist       
-##  Min.   : 4.0   Min.   :  2.00  
-##  1st Qu.:12.0   1st Qu.: 26.00  
-##  Median :15.0   Median : 36.00  
-##  Mean   :15.4   Mean   : 42.98  
-##  3rd Qu.:19.0   3rd Qu.: 56.00  
-##  Max.   :25.0   Max.   :120.00</a:t>
+            <a:pPr lvl="0"/>
+            <a:r>
+              <a:rPr/>
+              <a:t>It could appear that none of the variables are statically significant, with the exception of the fights subcategories, which makes sense Totalfights is based on them.</a:t>
+            </a:r>
+          </a:p>
+          <a:p>
+            <a:pPr lvl="0"/>
+            <a:r>
+              <a:rPr/>
+              <a:t>Surprisingly, Montreal Canadians, during the initial look, appeared to be statistically significant, yet in more robust analysis, it was not.</a:t>
+            </a:r>
+          </a:p>
+          <a:p>
+            <a:pPr lvl="0"/>
+            <a:r>
+              <a:rPr/>
+              <a:t>Year/TotalFights: Interesting to see that in 2020 there was no physical attendance due to COVID restrictions; fights still occurred and in somewhat in line with other years.</a:t>
             </a:r>
           </a:p>
         </p:txBody>
@@ -3339,50 +3315,67 @@
             </a:pPr>
             <a:r>
               <a:rPr/>
-              <a:t>Slide with Plot</a:t>
-            </a:r>
-          </a:p>
-        </p:txBody>
-      </p:sp>
-      <p:sp>
-        <p:nvSpPr>
-          <p:cNvPr id="3" name="Content Placeholder 2"/>
-          <p:cNvSpPr>
-            <a:spLocks noGrp="1"/>
-          </p:cNvSpPr>
-          <p:nvPr>
-            <p:ph idx="1"/>
-          </p:nvPr>
-        </p:nvSpPr>
-        <p:spPr/>
-        <p:txBody>
-          <a:bodyPr/>
-          <a:lstStyle/>
-          <a:p>
-            <a:pPr lvl="0" indent="0" marL="0">
+              <a:t>Plots of Interest</a:t>
+            </a:r>
+          </a:p>
+        </p:txBody>
+      </p:sp>
+      <p:pic>
+        <p:nvPicPr>
+          <p:cNvPr descr="fig:  tfyear_plot.png" id="0" name="Picture 1"/>
+          <p:cNvPicPr>
+            <a:picLocks noGrp="1" noChangeAspect="1"/>
+          </p:cNvPicPr>
+          <p:nvPr/>
+        </p:nvPicPr>
+        <p:blipFill>
+          <a:blip r:embed="rId2"/>
+          <a:stretch>
+            <a:fillRect/>
+          </a:stretch>
+        </p:blipFill>
+        <p:spPr bwMode="auto">
+          <a:xfrm>
+            <a:off x="1714500" y="1193800"/>
+            <a:ext cx="5715000" cy="2882900"/>
+          </a:xfrm>
+          <a:prstGeom prst="rect">
+            <a:avLst/>
+          </a:prstGeom>
+          <a:noFill/>
+          <a:ln w="9525">
+            <a:noFill/>
+            <a:headEnd/>
+            <a:tailEnd/>
+          </a:ln>
+        </p:spPr>
+      </p:pic>
+      <p:sp>
+        <p:nvSpPr>
+          <p:cNvPr id="1" name="TextBox 3"/>
+          <p:cNvSpPr txBox="1"/>
+          <p:nvPr/>
+        </p:nvSpPr>
+        <p:spPr>
+          <a:xfrm>
+            <a:off x="457200" y="4076700"/>
+            <a:ext cx="8229600" cy="508000"/>
+          </a:xfrm>
+          <a:prstGeom prst="rect">
+            <a:avLst/>
+          </a:prstGeom>
+          <a:noFill/>
+        </p:spPr>
+        <p:txBody>
+          <a:bodyPr/>
+          <a:lstStyle/>
+          <a:p>
+            <a:pPr lvl="0" indent="0" marL="0" algn="ctr">
               <a:buNone/>
             </a:pPr>
             <a:r>
               <a:rPr/>
-              <a:t>correlation map (in Jasons rmd - huge grid)  ## Future Work</a:t>
-            </a:r>
-          </a:p>
-          <a:p>
-            <a:pPr lvl="0" indent="0" marL="0">
-              <a:buNone/>
-            </a:pPr>
-            <a:r>
-              <a:rPr/>
-              <a:t>Explore additional variables and develop or acquire a more robust dataset to perhaps look at different violations and the impact of the fines on fighting.</a:t>
-            </a:r>
-          </a:p>
-          <a:p>
-            <a:pPr lvl="0" indent="0" marL="0">
-              <a:buNone/>
-            </a:pPr>
-            <a:r>
-              <a:rPr/>
-              <a:t>More time to further evaluate the data.</a:t>
+              <a:t>Fights per Year</a:t>
             </a:r>
           </a:p>
         </p:txBody>
@@ -3429,6 +3422,83 @@
             </a:pPr>
             <a:r>
               <a:rPr/>
+              <a:t>Future Work</a:t>
+            </a:r>
+          </a:p>
+        </p:txBody>
+      </p:sp>
+      <p:sp>
+        <p:nvSpPr>
+          <p:cNvPr id="3" name="Content Placeholder 2"/>
+          <p:cNvSpPr>
+            <a:spLocks noGrp="1"/>
+          </p:cNvSpPr>
+          <p:nvPr>
+            <p:ph idx="1"/>
+          </p:nvPr>
+        </p:nvSpPr>
+        <p:spPr/>
+        <p:txBody>
+          <a:bodyPr/>
+          <a:lstStyle/>
+          <a:p>
+            <a:pPr lvl="0"/>
+            <a:r>
+              <a:rPr/>
+              <a:t>Explore additional variables and develop or acquire a more robust dataset to perhaps look at different violations and the impact of the fines on fighting.</a:t>
+            </a:r>
+          </a:p>
+          <a:p>
+            <a:pPr lvl="0"/>
+            <a:r>
+              <a:rPr/>
+              <a:t>More time to further evaluate the data.</a:t>
+            </a:r>
+          </a:p>
+        </p:txBody>
+      </p:sp>
+    </p:spTree>
+  </p:cSld>
+</p:sld>
+</file>
+
+<file path=ppt/slides/slide13.xml><?xml version="1.0" encoding="utf-8"?>
+<p:sld xmlns:a="http://schemas.openxmlformats.org/drawingml/2006/main" xmlns:r="http://schemas.openxmlformats.org/officeDocument/2006/relationships" xmlns:p="http://schemas.openxmlformats.org/presentationml/2006/main">
+  <p:cSld>
+    <p:spTree>
+      <p:nvGrpSpPr>
+        <p:cNvPr id="1" name=""/>
+        <p:cNvGrpSpPr/>
+        <p:nvPr/>
+      </p:nvGrpSpPr>
+      <p:grpSpPr>
+        <a:xfrm>
+          <a:off x="0" y="0"/>
+          <a:ext cx="0" cy="0"/>
+          <a:chOff x="0" y="0"/>
+          <a:chExt cx="0" cy="0"/>
+        </a:xfrm>
+      </p:grpSpPr>
+      <p:sp>
+        <p:nvSpPr>
+          <p:cNvPr id="2" name="Title 1"/>
+          <p:cNvSpPr>
+            <a:spLocks noGrp="1"/>
+          </p:cNvSpPr>
+          <p:nvPr>
+            <p:ph type="title"/>
+          </p:nvPr>
+        </p:nvSpPr>
+        <p:spPr/>
+        <p:txBody>
+          <a:bodyPr/>
+          <a:lstStyle/>
+          <a:p>
+            <a:pPr lvl="0" indent="0" marL="0">
+              <a:buNone/>
+            </a:pPr>
+            <a:r>
+              <a:rPr/>
               <a:t>References</a:t>
             </a:r>
           </a:p>
@@ -3454,7 +3524,43 @@
             </a:pPr>
             <a:r>
               <a:rPr/>
-              <a:t>hockeyfights.com NHL.com</a:t>
+              <a:t>Hockey fight statistics. Hockey Fights. (n.d.). Retrieved December 2, 2022, from </a:t>
+            </a:r>
+            <a:r>
+              <a:rPr>
+                <a:hlinkClick r:id="rId2"/>
+              </a:rPr>
+              <a:t>https://www.hockeyfights.com/stats</a:t>
+            </a:r>
+          </a:p>
+          <a:p>
+            <a:pPr lvl="0" indent="0" marL="0">
+              <a:buNone/>
+            </a:pPr>
+            <a:r>
+              <a:rPr/>
+              <a:t>Hockey statistics and history for the NHL and more! hockey DB. (n.d.). From </a:t>
+            </a:r>
+            <a:r>
+              <a:rPr>
+                <a:hlinkClick r:id="rId3"/>
+              </a:rPr>
+              <a:t>https://www.hockeydb.com/</a:t>
+            </a:r>
+          </a:p>
+          <a:p>
+            <a:pPr lvl="0" indent="0" marL="0">
+              <a:buNone/>
+            </a:pPr>
+            <a:r>
+              <a:rPr/>
+              <a:t>NHL stats, history, scores, standings, playoffs, Schedule &amp; Records. Hockey. (n.d.). From </a:t>
+            </a:r>
+            <a:r>
+              <a:rPr>
+                <a:hlinkClick r:id="rId4"/>
+              </a:rPr>
+              <a:t>https://www.hockey-reference.com/</a:t>
             </a:r>
           </a:p>
         </p:txBody>
@@ -3941,25 +4047,62 @@
           </a:p>
         </p:txBody>
       </p:sp>
-      <p:sp>
-        <p:nvSpPr>
-          <p:cNvPr id="3" name="Content Placeholder 2"/>
-          <p:cNvSpPr>
-            <a:spLocks noGrp="1"/>
-          </p:cNvSpPr>
-          <p:nvPr>
-            <p:ph idx="1"/>
-          </p:nvPr>
-        </p:nvSpPr>
-        <p:spPr/>
-        <p:txBody>
-          <a:bodyPr/>
-          <a:lstStyle/>
-          <a:p>
-            <a:pPr lvl="0"/>
-            <a:r>
-              <a:rPr/>
-              <a:t>excluded teams for readability of slide</a:t>
+      <p:pic>
+        <p:nvPicPr>
+          <p:cNvPr descr="fig:  cormap.png" id="0" name="Picture 1"/>
+          <p:cNvPicPr>
+            <a:picLocks noGrp="1" noChangeAspect="1"/>
+          </p:cNvPicPr>
+          <p:nvPr/>
+        </p:nvPicPr>
+        <p:blipFill>
+          <a:blip r:embed="rId2"/>
+          <a:stretch>
+            <a:fillRect/>
+          </a:stretch>
+        </p:blipFill>
+        <p:spPr bwMode="auto">
+          <a:xfrm>
+            <a:off x="1117600" y="1193800"/>
+            <a:ext cx="6896100" cy="2882900"/>
+          </a:xfrm>
+          <a:prstGeom prst="rect">
+            <a:avLst/>
+          </a:prstGeom>
+          <a:noFill/>
+          <a:ln w="9525">
+            <a:noFill/>
+            <a:headEnd/>
+            <a:tailEnd/>
+          </a:ln>
+        </p:spPr>
+      </p:pic>
+      <p:sp>
+        <p:nvSpPr>
+          <p:cNvPr id="1" name="TextBox 3"/>
+          <p:cNvSpPr txBox="1"/>
+          <p:nvPr/>
+        </p:nvSpPr>
+        <p:spPr>
+          <a:xfrm>
+            <a:off x="457200" y="4076700"/>
+            <a:ext cx="8229600" cy="508000"/>
+          </a:xfrm>
+          <a:prstGeom prst="rect">
+            <a:avLst/>
+          </a:prstGeom>
+          <a:noFill/>
+        </p:spPr>
+        <p:txBody>
+          <a:bodyPr/>
+          <a:lstStyle/>
+          <a:p>
+            <a:pPr lvl="0" indent="0" marL="0" algn="ctr">
+              <a:buNone/>
+            </a:pPr>
+            <a:r>
+              <a:rPr/>
+              <a:t>Correlation Map of all Variables</a:t>
             </a:r>
           </a:p>
         </p:txBody>
@@ -4006,74 +4149,67 @@
             </a:pPr>
             <a:r>
               <a:rPr/>
-              <a:t>Application of DSCI 445 Concepts</a:t>
-            </a:r>
-          </a:p>
-        </p:txBody>
-      </p:sp>
-      <p:sp>
-        <p:nvSpPr>
-          <p:cNvPr id="3" name="Content Placeholder 2"/>
-          <p:cNvSpPr>
-            <a:spLocks noGrp="1"/>
-          </p:cNvSpPr>
-          <p:nvPr>
-            <p:ph idx="1"/>
-          </p:nvPr>
-        </p:nvSpPr>
-        <p:spPr/>
-        <p:txBody>
-          <a:bodyPr/>
-          <a:lstStyle/>
-          <a:p>
-            <a:pPr lvl="0" indent="0" marL="0">
+              <a:t>Zoom in of Correlation Map</a:t>
+            </a:r>
+          </a:p>
+        </p:txBody>
+      </p:sp>
+      <p:pic>
+        <p:nvPicPr>
+          <p:cNvPr descr="fig:  cormap_reduced.png" id="0" name="Picture 1"/>
+          <p:cNvPicPr>
+            <a:picLocks noGrp="1" noChangeAspect="1"/>
+          </p:cNvPicPr>
+          <p:nvPr/>
+        </p:nvPicPr>
+        <p:blipFill>
+          <a:blip r:embed="rId2"/>
+          <a:stretch>
+            <a:fillRect/>
+          </a:stretch>
+        </p:blipFill>
+        <p:spPr bwMode="auto">
+          <a:xfrm>
+            <a:off x="4191000" y="1193800"/>
+            <a:ext cx="774700" cy="2882900"/>
+          </a:xfrm>
+          <a:prstGeom prst="rect">
+            <a:avLst/>
+          </a:prstGeom>
+          <a:noFill/>
+          <a:ln w="9525">
+            <a:noFill/>
+            <a:headEnd/>
+            <a:tailEnd/>
+          </a:ln>
+        </p:spPr>
+      </p:pic>
+      <p:sp>
+        <p:nvSpPr>
+          <p:cNvPr id="1" name="TextBox 3"/>
+          <p:cNvSpPr txBox="1"/>
+          <p:nvPr/>
+        </p:nvSpPr>
+        <p:spPr>
+          <a:xfrm>
+            <a:off x="457200" y="4076700"/>
+            <a:ext cx="8229600" cy="508000"/>
+          </a:xfrm>
+          <a:prstGeom prst="rect">
+            <a:avLst/>
+          </a:prstGeom>
+          <a:noFill/>
+        </p:spPr>
+        <p:txBody>
+          <a:bodyPr/>
+          <a:lstStyle/>
+          <a:p>
+            <a:pPr lvl="0" indent="0" marL="0" algn="ctr">
               <a:buNone/>
             </a:pPr>
             <a:r>
               <a:rPr/>
-              <a:t>Utilized: </a:t>
-            </a:r>
-          </a:p>
-          <a:p>
-            <a:pPr lvl="0"/>
-            <a:r>
-              <a:rPr/>
-              <a:t>ggplot</a:t>
-            </a:r>
-          </a:p>
-          <a:p>
-            <a:pPr lvl="0"/>
-            <a:r>
-              <a:rPr/>
-              <a:t>lm</a:t>
-            </a:r>
-          </a:p>
-          <a:p>
-            <a:pPr lvl="0"/>
-            <a:r>
-              <a:rPr/>
-              <a:t>splitting dataset to train and test</a:t>
-            </a:r>
-          </a:p>
-          <a:p>
-            <a:pPr lvl="0"/>
-            <a:r>
-              <a:rPr/>
-              <a:t>Ridge regressions</a:t>
-            </a:r>
-          </a:p>
-          <a:p>
-            <a:pPr lvl="0"/>
-            <a:r>
-              <a:rPr/>
-              <a:t>adjusted R-squared</a:t>
-            </a:r>
-          </a:p>
-          <a:p>
-            <a:pPr lvl="0"/>
-            <a:r>
-              <a:rPr/>
-              <a:t>BIC</a:t>
+              <a:t>Zoom in of Correlation Map</a:t>
             </a:r>
           </a:p>
         </p:txBody>
@@ -4120,7 +4256,7 @@
             </a:pPr>
             <a:r>
               <a:rPr/>
-              <a:t>Challenges with Data</a:t>
+              <a:t>Application of DSCI 445 Concepts</a:t>
             </a:r>
           </a:p>
         </p:txBody>
@@ -4140,38 +4276,54 @@
           <a:bodyPr/>
           <a:lstStyle/>
           <a:p>
+            <a:pPr lvl="0" indent="0" marL="0">
+              <a:buNone/>
+            </a:pPr>
+            <a:r>
+              <a:rPr/>
+              <a:t>Utilized: </a:t>
+            </a:r>
+          </a:p>
+          <a:p>
             <a:pPr lvl="0"/>
             <a:r>
               <a:rPr/>
-              <a:t>Readily available or consolidated data, had to combine multiple sources to form dataset</a:t>
+              <a:t>ggplot</a:t>
             </a:r>
           </a:p>
           <a:p>
             <a:pPr lvl="0"/>
             <a:r>
               <a:rPr/>
-              <a:t>Several teams were created during the time frame, creating incomplete information</a:t>
+              <a:t>lm</a:t>
             </a:r>
           </a:p>
           <a:p>
             <a:pPr lvl="0"/>
             <a:r>
               <a:rPr/>
-              <a:t>Utilized omit.na code to compensate</a:t>
+              <a:t>splitting dataset to train and test</a:t>
             </a:r>
           </a:p>
           <a:p>
             <a:pPr lvl="0"/>
             <a:r>
               <a:rPr/>
-              <a:t>pre-fight, post-fight, and in-season fighting</a:t>
+              <a:t>Ridge regressions</a:t>
             </a:r>
           </a:p>
           <a:p>
             <a:pPr lvl="0"/>
             <a:r>
               <a:rPr/>
-              <a:t>availability of more information on the specifics of the fight (time in the game, type, number of people in the fight, instigator versus respondent of the fight, etc).</a:t>
+              <a:t>adjusted R-squared</a:t>
+            </a:r>
+          </a:p>
+          <a:p>
+            <a:pPr lvl="0"/>
+            <a:r>
+              <a:rPr/>
+              <a:t>BIC</a:t>
             </a:r>
           </a:p>
         </p:txBody>
@@ -4218,7 +4370,7 @@
             </a:pPr>
             <a:r>
               <a:rPr/>
-              <a:t>Findings</a:t>
+              <a:t>Challenges with Data</a:t>
             </a:r>
           </a:p>
         </p:txBody>
@@ -4241,21 +4393,35 @@
             <a:pPr lvl="0"/>
             <a:r>
               <a:rPr/>
-              <a:t>It could appear that none of the variables are statically significant, with the exception of the fights subcategories, which makes sense Totalfights is based on them.</a:t>
+              <a:t>Readily available or consolidated data, had to combine multiple sources to form dataset</a:t>
             </a:r>
           </a:p>
           <a:p>
             <a:pPr lvl="0"/>
             <a:r>
               <a:rPr/>
-              <a:t>Surprisingly, Montreal Canadians, during the initial look, appeared to be statistically significant, yet in more robust analysis, it was not.</a:t>
+              <a:t>Several teams were created during the time frame, creating incomplete information</a:t>
             </a:r>
           </a:p>
           <a:p>
             <a:pPr lvl="0"/>
             <a:r>
               <a:rPr/>
-              <a:t>Year/TotalFights: Interesting to see that in 2020 there was no physical attendance due to COVID restrictions; fights still occurred and in somewhat in line with other years.</a:t>
+              <a:t>Utilized omit.na code to compensate</a:t>
+            </a:r>
+          </a:p>
+          <a:p>
+            <a:pPr lvl="0"/>
+            <a:r>
+              <a:rPr/>
+              <a:t>pre-fight, post-fight, and in-season fighting</a:t>
+            </a:r>
+          </a:p>
+          <a:p>
+            <a:pPr lvl="0"/>
+            <a:r>
+              <a:rPr/>
+              <a:t>availability of more information on the specifics of the fight (time in the game, type, number of people in the fight, instigator versus respondent of the fight, etc).</a:t>
             </a:r>
           </a:p>
         </p:txBody>

</xml_diff>

<commit_message>
Finishing touches for presentation.
</commit_message>
<xml_diff>
--- a/TermProject_Presentationv3.pptx
+++ b/TermProject_Presentationv3.pptx
@@ -3159,7 +3159,7 @@
             <a:br/>
             <a:r>
               <a:rPr/>
-              <a:t>Chien Lin Jason Nero Sarah Sublett</a:t>
+              <a:t>Chien Lin Jason Nero Sarah Sublett - Group 1</a:t>
             </a:r>
           </a:p>
         </p:txBody>
@@ -3678,7 +3678,7 @@
             </a:pPr>
             <a:r>
               <a:rPr/>
-              <a:t>DSCI 445 </a:t>
+              <a:t>DSCI 445 - Group 1 </a:t>
             </a:r>
           </a:p>
           <a:p>
@@ -3834,7 +3834,7 @@
             <a:pPr lvl="0"/>
             <a:r>
               <a:rPr/>
-              <a:t>Utilizing fight data from hockeyfights.com and NHL.com</a:t>
+              <a:t>Utilizing fight data from hockeyfights.com and general hockey statistics from hockeydb.com and hockey-reference.com</a:t>
             </a:r>
           </a:p>
           <a:p>
@@ -3869,7 +3869,7 @@
             <a:pPr lvl="0"/>
             <a:r>
               <a:rPr/>
-              <a:t>1,312 games per regular season, with each team playing 82 games</a:t>
+              <a:t>1,312 games per regular season, with each team playing 82</a:t>
             </a:r>
           </a:p>
         </p:txBody>
@@ -4209,7 +4209,7 @@
             </a:pPr>
             <a:r>
               <a:rPr/>
-              <a:t>Zoom in of Correlation Map</a:t>
+              <a:t>Total fights correlation</a:t>
             </a:r>
           </a:p>
         </p:txBody>
@@ -4324,6 +4324,13 @@
             <a:r>
               <a:rPr/>
               <a:t>BIC</a:t>
+            </a:r>
+          </a:p>
+          <a:p>
+            <a:pPr lvl="0"/>
+            <a:r>
+              <a:rPr/>
+              <a:t>Cross Validation!</a:t>
             </a:r>
           </a:p>
         </p:txBody>

</xml_diff>